<commit_message>
Final version before submission for review
</commit_message>
<xml_diff>
--- a/documentation/Quark Wireframes and User Stories.pptx
+++ b/documentation/Quark Wireframes and User Stories.pptx
@@ -128,6 +128,9 @@
   <p:extLst>
     <p:ext uri="{EFAFB233-063F-42B5-8137-9DF3F51BA10A}">
       <p15:sldGuideLst xmlns:p15="http://schemas.microsoft.com/office/powerpoint/2012/main"/>
+    </p:ext>
+    <p:ext uri="{2D200454-40CA-4A62-9FC3-DE9A4176ACB9}">
+      <p15:notesGuideLst xmlns:p15="http://schemas.microsoft.com/office/powerpoint/2012/main"/>
     </p:ext>
   </p:extLst>
 </p:presentation>
@@ -4995,7 +4998,7 @@
                     <a:schemeClr val="bg1"/>
                   </a:solidFill>
                 </a:rPr>
-                <a:t>Log In</a:t>
+                <a:t>Signup</a:t>
               </a:r>
             </a:p>
           </p:txBody>
@@ -24672,7 +24675,7 @@
                     <a:schemeClr val="bg1"/>
                   </a:solidFill>
                 </a:rPr>
-                <a:t>Log In</a:t>
+                <a:t>Sign up</a:t>
               </a:r>
             </a:p>
           </p:txBody>

</xml_diff>